<commit_message>
Added zone temperature prediction using ANN model - but the temperature out isnot very sensitive to control input changes. Need check the thermal response of zone temperature in terms of control inputs
</commit_message>
<xml_diff>
--- a/meeting/20210316.pptx
+++ b/meeting/20210316.pptx
@@ -267,7 +267,7 @@
           <a:p>
             <a:fld id="{9508E511-C4A5-4250-91AD-093C2CA813FA}" type="datetimeFigureOut">
               <a:rPr lang="en-US" smtClean="0"/>
-              <a:t>3/16/2021</a:t>
+              <a:t>3/19/2021</a:t>
             </a:fld>
             <a:endParaRPr lang="en-US"/>
           </a:p>
@@ -465,7 +465,7 @@
           <a:p>
             <a:fld id="{9508E511-C4A5-4250-91AD-093C2CA813FA}" type="datetimeFigureOut">
               <a:rPr lang="en-US" smtClean="0"/>
-              <a:t>3/16/2021</a:t>
+              <a:t>3/19/2021</a:t>
             </a:fld>
             <a:endParaRPr lang="en-US"/>
           </a:p>
@@ -673,7 +673,7 @@
           <a:p>
             <a:fld id="{9508E511-C4A5-4250-91AD-093C2CA813FA}" type="datetimeFigureOut">
               <a:rPr lang="en-US" smtClean="0"/>
-              <a:t>3/16/2021</a:t>
+              <a:t>3/19/2021</a:t>
             </a:fld>
             <a:endParaRPr lang="en-US"/>
           </a:p>
@@ -871,7 +871,7 @@
           <a:p>
             <a:fld id="{9508E511-C4A5-4250-91AD-093C2CA813FA}" type="datetimeFigureOut">
               <a:rPr lang="en-US" smtClean="0"/>
-              <a:t>3/16/2021</a:t>
+              <a:t>3/19/2021</a:t>
             </a:fld>
             <a:endParaRPr lang="en-US"/>
           </a:p>
@@ -1146,7 +1146,7 @@
           <a:p>
             <a:fld id="{9508E511-C4A5-4250-91AD-093C2CA813FA}" type="datetimeFigureOut">
               <a:rPr lang="en-US" smtClean="0"/>
-              <a:t>3/16/2021</a:t>
+              <a:t>3/19/2021</a:t>
             </a:fld>
             <a:endParaRPr lang="en-US"/>
           </a:p>
@@ -1411,7 +1411,7 @@
           <a:p>
             <a:fld id="{9508E511-C4A5-4250-91AD-093C2CA813FA}" type="datetimeFigureOut">
               <a:rPr lang="en-US" smtClean="0"/>
-              <a:t>3/16/2021</a:t>
+              <a:t>3/19/2021</a:t>
             </a:fld>
             <a:endParaRPr lang="en-US"/>
           </a:p>
@@ -1823,7 +1823,7 @@
           <a:p>
             <a:fld id="{9508E511-C4A5-4250-91AD-093C2CA813FA}" type="datetimeFigureOut">
               <a:rPr lang="en-US" smtClean="0"/>
-              <a:t>3/16/2021</a:t>
+              <a:t>3/19/2021</a:t>
             </a:fld>
             <a:endParaRPr lang="en-US"/>
           </a:p>
@@ -1964,7 +1964,7 @@
           <a:p>
             <a:fld id="{9508E511-C4A5-4250-91AD-093C2CA813FA}" type="datetimeFigureOut">
               <a:rPr lang="en-US" smtClean="0"/>
-              <a:t>3/16/2021</a:t>
+              <a:t>3/19/2021</a:t>
             </a:fld>
             <a:endParaRPr lang="en-US"/>
           </a:p>
@@ -2077,7 +2077,7 @@
           <a:p>
             <a:fld id="{9508E511-C4A5-4250-91AD-093C2CA813FA}" type="datetimeFigureOut">
               <a:rPr lang="en-US" smtClean="0"/>
-              <a:t>3/16/2021</a:t>
+              <a:t>3/19/2021</a:t>
             </a:fld>
             <a:endParaRPr lang="en-US"/>
           </a:p>
@@ -2388,7 +2388,7 @@
           <a:p>
             <a:fld id="{9508E511-C4A5-4250-91AD-093C2CA813FA}" type="datetimeFigureOut">
               <a:rPr lang="en-US" smtClean="0"/>
-              <a:t>3/16/2021</a:t>
+              <a:t>3/19/2021</a:t>
             </a:fld>
             <a:endParaRPr lang="en-US"/>
           </a:p>
@@ -2676,7 +2676,7 @@
           <a:p>
             <a:fld id="{9508E511-C4A5-4250-91AD-093C2CA813FA}" type="datetimeFigureOut">
               <a:rPr lang="en-US" smtClean="0"/>
-              <a:t>3/16/2021</a:t>
+              <a:t>3/19/2021</a:t>
             </a:fld>
             <a:endParaRPr lang="en-US"/>
           </a:p>
@@ -2917,7 +2917,7 @@
           <a:p>
             <a:fld id="{9508E511-C4A5-4250-91AD-093C2CA813FA}" type="datetimeFigureOut">
               <a:rPr lang="en-US" smtClean="0"/>
-              <a:t>3/16/2021</a:t>
+              <a:t>3/19/2021</a:t>
             </a:fld>
             <a:endParaRPr lang="en-US"/>
           </a:p>
@@ -4737,7 +4737,7 @@
           <p:cNvPr id="2" name="Title 1">
             <a:extLst>
               <a:ext uri="{FF2B5EF4-FFF2-40B4-BE49-F238E27FC236}">
-                <a16:creationId xmlns:a16="http://schemas.microsoft.com/office/drawing/2014/main" id="{923BCFE4-32A6-4488-86E1-9595A24A89E9}"/>
+                <a16:creationId xmlns:a16="http://schemas.microsoft.com/office/drawing/2014/main" id="{DC645DAF-B11F-4FD3-BAF4-C4A24C6A39D0}"/>
               </a:ext>
             </a:extLst>
           </p:cNvPr>
@@ -4755,67 +4755,43 @@
           <a:p>
             <a:r>
               <a:rPr lang="en-US" dirty="0"/>
-              <a:t>PH=1</a:t>
-            </a:r>
-          </a:p>
-        </p:txBody>
-      </p:sp>
-      <p:sp>
-        <p:nvSpPr>
-          <p:cNvPr id="3" name="Content Placeholder 2">
-            <a:extLst>
-              <a:ext uri="{FF2B5EF4-FFF2-40B4-BE49-F238E27FC236}">
-                <a16:creationId xmlns:a16="http://schemas.microsoft.com/office/drawing/2014/main" id="{6A5CB695-6D1F-4882-BFDC-F25980683891}"/>
-              </a:ext>
-            </a:extLst>
-          </p:cNvPr>
-          <p:cNvSpPr>
-            <a:spLocks noGrp="1"/>
-          </p:cNvSpPr>
-          <p:nvPr>
-            <p:ph idx="1"/>
-          </p:nvPr>
-        </p:nvSpPr>
-        <p:spPr/>
-        <p:txBody>
-          <a:bodyPr/>
-          <a:lstStyle/>
-          <a:p>
-            <a:r>
-              <a:rPr lang="en-US" dirty="0"/>
-              <a:t>Obj = minimize fan power</a:t>
+              <a:t>Debug MPC</a:t>
             </a:r>
           </a:p>
         </p:txBody>
       </p:sp>
       <p:pic>
         <p:nvPicPr>
-          <p:cNvPr id="4" name="Picture 3">
-            <a:extLst>
-              <a:ext uri="{FF2B5EF4-FFF2-40B4-BE49-F238E27FC236}">
-                <a16:creationId xmlns:a16="http://schemas.microsoft.com/office/drawing/2014/main" id="{7C4EBF79-BD30-4DFE-95AE-505DB20E500A}"/>
+          <p:cNvPr id="4" name="Content Placeholder 7">
+            <a:extLst>
+              <a:ext uri="{FF2B5EF4-FFF2-40B4-BE49-F238E27FC236}">
+                <a16:creationId xmlns:a16="http://schemas.microsoft.com/office/drawing/2014/main" id="{D65265B0-6B8E-4FAD-98BD-433C59595EEE}"/>
               </a:ext>
             </a:extLst>
           </p:cNvPr>
           <p:cNvPicPr>
-            <a:picLocks noChangeAspect="1"/>
+            <a:picLocks noGrp="1" noChangeAspect="1"/>
           </p:cNvPicPr>
-          <p:nvPr/>
+          <p:nvPr>
+            <p:ph idx="1"/>
+          </p:nvPr>
         </p:nvPicPr>
-        <p:blipFill>
-          <a:blip r:embed="rId2"/>
-          <a:stretch>
-            <a:fillRect/>
-          </a:stretch>
+        <p:blipFill rotWithShape="1">
+          <a:blip r:embed="rId2">
+            <a:extLst>
+              <a:ext uri="{28A0092B-C50C-407E-A947-70E740481C1C}">
+                <a14:useLocalDpi xmlns:a14="http://schemas.microsoft.com/office/drawing/2010/main" val="0"/>
+              </a:ext>
+            </a:extLst>
+          </a:blip>
+          <a:srcRect t="10080" b="5530"/>
+          <a:stretch/>
         </p:blipFill>
         <p:spPr>
           <a:xfrm>
-            <a:off x="723042" y="2301860"/>
-            <a:ext cx="5445508" cy="4043493"/>
+            <a:off x="4101463" y="1906255"/>
+            <a:ext cx="5851429" cy="3703516"/>
           </a:xfrm>
-          <a:prstGeom prst="rect">
-            <a:avLst/>
-          </a:prstGeom>
         </p:spPr>
       </p:pic>
       <p:sp>
@@ -4823,7 +4799,7 @@
           <p:cNvPr id="5" name="TextBox 4">
             <a:extLst>
               <a:ext uri="{FF2B5EF4-FFF2-40B4-BE49-F238E27FC236}">
-                <a16:creationId xmlns:a16="http://schemas.microsoft.com/office/drawing/2014/main" id="{6BDEC87D-29FF-4790-B386-A326B0A5E064}"/>
+                <a16:creationId xmlns:a16="http://schemas.microsoft.com/office/drawing/2014/main" id="{A223D812-C69B-465E-B6E4-96339EA05E92}"/>
               </a:ext>
             </a:extLst>
           </p:cNvPr>
@@ -4832,8 +4808,8 @@
         </p:nvSpPr>
         <p:spPr>
           <a:xfrm>
-            <a:off x="1132514" y="6337795"/>
-            <a:ext cx="4958537" cy="369332"/>
+            <a:off x="838200" y="2743200"/>
+            <a:ext cx="1923412" cy="646331"/>
           </a:xfrm>
           <a:prstGeom prst="rect">
             <a:avLst/>
@@ -4848,107 +4824,13 @@
           <a:p>
             <a:r>
               <a:rPr lang="en-US" dirty="0"/>
-              <a:t>Power model uses only control inputs (fan air flow)</a:t>
-            </a:r>
-          </a:p>
-        </p:txBody>
-      </p:sp>
-      <p:pic>
-        <p:nvPicPr>
-          <p:cNvPr id="6" name="Picture 5">
-            <a:extLst>
-              <a:ext uri="{FF2B5EF4-FFF2-40B4-BE49-F238E27FC236}">
-                <a16:creationId xmlns:a16="http://schemas.microsoft.com/office/drawing/2014/main" id="{F0C4C33B-012D-4703-81E5-AFE930894B4A}"/>
-              </a:ext>
-            </a:extLst>
-          </p:cNvPr>
-          <p:cNvPicPr>
-            <a:picLocks noChangeAspect="1"/>
-          </p:cNvPicPr>
-          <p:nvPr/>
-        </p:nvPicPr>
-        <p:blipFill>
-          <a:blip r:embed="rId3"/>
-          <a:stretch>
-            <a:fillRect/>
-          </a:stretch>
-        </p:blipFill>
-        <p:spPr>
-          <a:xfrm>
-            <a:off x="6283708" y="2251539"/>
-            <a:ext cx="5699826" cy="4005840"/>
-          </a:xfrm>
-          <a:prstGeom prst="rect">
-            <a:avLst/>
-          </a:prstGeom>
-        </p:spPr>
-      </p:pic>
-      <p:sp>
-        <p:nvSpPr>
-          <p:cNvPr id="7" name="TextBox 6">
-            <a:extLst>
-              <a:ext uri="{FF2B5EF4-FFF2-40B4-BE49-F238E27FC236}">
-                <a16:creationId xmlns:a16="http://schemas.microsoft.com/office/drawing/2014/main" id="{B9D1989D-4EB3-44C2-B0A3-5152CC8BCF98}"/>
-              </a:ext>
-            </a:extLst>
-          </p:cNvPr>
-          <p:cNvSpPr txBox="1"/>
-          <p:nvPr/>
-        </p:nvSpPr>
-        <p:spPr>
-          <a:xfrm>
-            <a:off x="6654352" y="1782776"/>
-            <a:ext cx="3500382" cy="369332"/>
-          </a:xfrm>
-          <a:prstGeom prst="rect">
-            <a:avLst/>
-          </a:prstGeom>
-          <a:noFill/>
-        </p:spPr>
-        <p:txBody>
-          <a:bodyPr wrap="none" rtlCol="0">
-            <a:spAutoFit/>
-          </a:bodyPr>
-          <a:lstStyle/>
+              <a:t>Fast fan dynamics</a:t>
+            </a:r>
+          </a:p>
           <a:p>
             <a:r>
               <a:rPr lang="en-US" dirty="0"/>
-              <a:t>Obj = power + temperature penalty</a:t>
-            </a:r>
-          </a:p>
-        </p:txBody>
-      </p:sp>
-      <p:sp>
-        <p:nvSpPr>
-          <p:cNvPr id="8" name="TextBox 7">
-            <a:extLst>
-              <a:ext uri="{FF2B5EF4-FFF2-40B4-BE49-F238E27FC236}">
-                <a16:creationId xmlns:a16="http://schemas.microsoft.com/office/drawing/2014/main" id="{64DF9064-FBCB-44CE-A3AB-F8E955F38ADF}"/>
-              </a:ext>
-            </a:extLst>
-          </p:cNvPr>
-          <p:cNvSpPr txBox="1"/>
-          <p:nvPr/>
-        </p:nvSpPr>
-        <p:spPr>
-          <a:xfrm>
-            <a:off x="7415869" y="6189567"/>
-            <a:ext cx="4053089" cy="646331"/>
-          </a:xfrm>
-          <a:prstGeom prst="rect">
-            <a:avLst/>
-          </a:prstGeom>
-          <a:noFill/>
-        </p:spPr>
-        <p:txBody>
-          <a:bodyPr wrap="square" rtlCol="0">
-            <a:spAutoFit/>
-          </a:bodyPr>
-          <a:lstStyle/>
-          <a:p>
-            <a:r>
-              <a:rPr lang="en-US" dirty="0"/>
-              <a:t>Temperature predictor might have unacceptable errors</a:t>
+              <a:t>Exceed constraints</a:t>
             </a:r>
           </a:p>
         </p:txBody>
@@ -4956,7 +4838,7 @@
     </p:spTree>
     <p:extLst>
       <p:ext uri="{BB962C8B-B14F-4D97-AF65-F5344CB8AC3E}">
-        <p14:creationId xmlns:p14="http://schemas.microsoft.com/office/powerpoint/2010/main" val="3381481836"/>
+        <p14:creationId xmlns:p14="http://schemas.microsoft.com/office/powerpoint/2010/main" val="1614232998"/>
       </p:ext>
     </p:extLst>
   </p:cSld>
@@ -4988,7 +4870,7 @@
           <p:cNvPr id="2" name="Title 1">
             <a:extLst>
               <a:ext uri="{FF2B5EF4-FFF2-40B4-BE49-F238E27FC236}">
-                <a16:creationId xmlns:a16="http://schemas.microsoft.com/office/drawing/2014/main" id="{B332BEAC-E452-41B0-B4F7-7AF58A771422}"/>
+                <a16:creationId xmlns:a16="http://schemas.microsoft.com/office/drawing/2014/main" id="{2E2E1E41-84E8-43EE-B9C3-F8939717CC01}"/>
               </a:ext>
             </a:extLst>
           </p:cNvPr>
@@ -5004,25 +4886,57 @@
           <a:bodyPr/>
           <a:lstStyle/>
           <a:p>
-            <a:endParaRPr lang="en-US"/>
+            <a:r>
+              <a:rPr lang="en-US" dirty="0"/>
+              <a:t>3/19</a:t>
+            </a:r>
+          </a:p>
+        </p:txBody>
+      </p:sp>
+      <p:sp>
+        <p:nvSpPr>
+          <p:cNvPr id="3" name="Content Placeholder 2">
+            <a:extLst>
+              <a:ext uri="{FF2B5EF4-FFF2-40B4-BE49-F238E27FC236}">
+                <a16:creationId xmlns:a16="http://schemas.microsoft.com/office/drawing/2014/main" id="{ED5B9780-EE98-4AFC-ACFB-FA10C3B69FF4}"/>
+              </a:ext>
+            </a:extLst>
+          </p:cNvPr>
+          <p:cNvSpPr>
+            <a:spLocks noGrp="1"/>
+          </p:cNvSpPr>
+          <p:nvPr>
+            <p:ph idx="1"/>
+          </p:nvPr>
+        </p:nvSpPr>
+        <p:spPr/>
+        <p:txBody>
+          <a:bodyPr/>
+          <a:lstStyle/>
+          <a:p>
+            <a:r>
+              <a:rPr lang="en-US" dirty="0"/>
+              <a:t>MPC model accuracy</a:t>
+            </a:r>
+          </a:p>
+          <a:p>
+            <a:endParaRPr lang="en-US" dirty="0"/>
           </a:p>
         </p:txBody>
       </p:sp>
       <p:pic>
         <p:nvPicPr>
-          <p:cNvPr id="4" name="Content Placeholder 3">
-            <a:extLst>
-              <a:ext uri="{FF2B5EF4-FFF2-40B4-BE49-F238E27FC236}">
-                <a16:creationId xmlns:a16="http://schemas.microsoft.com/office/drawing/2014/main" id="{90DC8FF0-03D5-4DF2-B3EF-FD7B75A57EFB}"/>
+          <p:cNvPr id="4" name="Picture 3">
+            <a:extLst>
+              <a:ext uri="{FF2B5EF4-FFF2-40B4-BE49-F238E27FC236}">
+                <a16:creationId xmlns:a16="http://schemas.microsoft.com/office/drawing/2014/main" id="{29557EF6-374B-426F-B28F-F74F2C9815A9}"/>
               </a:ext>
             </a:extLst>
           </p:cNvPr>
           <p:cNvPicPr>
-            <a:picLocks noGrp="1" noChangeAspect="1"/>
+            <a:picLocks noChangeAspect="1"/>
           </p:cNvPicPr>
-          <p:nvPr>
-            <p:ph idx="1"/>
-          </p:nvPr>
+          <p:nvPr/>
         </p:nvPicPr>
         <p:blipFill>
           <a:blip r:embed="rId2"/>
@@ -5032,20 +4946,265 @@
         </p:blipFill>
         <p:spPr>
           <a:xfrm>
-            <a:off x="532657" y="2507560"/>
-            <a:ext cx="5052578" cy="3605662"/>
+            <a:off x="6492728" y="2896299"/>
+            <a:ext cx="4598276" cy="3200400"/>
           </a:xfrm>
           <a:prstGeom prst="rect">
             <a:avLst/>
           </a:prstGeom>
         </p:spPr>
       </p:pic>
-      <p:sp>
-        <p:nvSpPr>
-          <p:cNvPr id="5" name="TextBox 4">
-            <a:extLst>
-              <a:ext uri="{FF2B5EF4-FFF2-40B4-BE49-F238E27FC236}">
-                <a16:creationId xmlns:a16="http://schemas.microsoft.com/office/drawing/2014/main" id="{54430AA2-72D3-4B1E-B935-CEB82315E71D}"/>
+      <mc:AlternateContent xmlns:mc="http://schemas.openxmlformats.org/markup-compatibility/2006">
+        <mc:Choice xmlns:a14="http://schemas.microsoft.com/office/drawing/2010/main" Requires="a14">
+          <p:sp>
+            <p:nvSpPr>
+              <p:cNvPr id="6" name="TextBox 5">
+                <a:extLst>
+                  <a:ext uri="{FF2B5EF4-FFF2-40B4-BE49-F238E27FC236}">
+                    <a16:creationId xmlns:a16="http://schemas.microsoft.com/office/drawing/2014/main" id="{16DEB784-AFED-4ECA-BAB2-4F9DAEB6BD1B}"/>
+                  </a:ext>
+                </a:extLst>
+              </p:cNvPr>
+              <p:cNvSpPr txBox="1"/>
+              <p:nvPr/>
+            </p:nvSpPr>
+            <p:spPr>
+              <a:xfrm>
+                <a:off x="7176781" y="2117368"/>
+                <a:ext cx="1836400" cy="778931"/>
+              </a:xfrm>
+              <a:prstGeom prst="rect">
+                <a:avLst/>
+              </a:prstGeom>
+              <a:noFill/>
+            </p:spPr>
+            <p:txBody>
+              <a:bodyPr wrap="none" lIns="0" tIns="0" rIns="0" bIns="0" rtlCol="0">
+                <a:spAutoFit/>
+              </a:bodyPr>
+              <a:lstStyle/>
+              <a:p>
+                <a:pPr/>
+                <a14:m>
+                  <m:oMathPara xmlns:m="http://schemas.openxmlformats.org/officeDocument/2006/math">
+                    <m:oMathParaPr>
+                      <m:jc m:val="centerGroup"/>
+                    </m:oMathParaPr>
+                    <m:oMath xmlns:m="http://schemas.openxmlformats.org/officeDocument/2006/math">
+                      <m:func>
+                        <m:funcPr>
+                          <m:ctrlPr>
+                            <a:rPr lang="en-US" b="0" i="1" smtClean="0">
+                              <a:latin typeface="Cambria Math" panose="02040503050406030204" pitchFamily="18" charset="0"/>
+                            </a:rPr>
+                          </m:ctrlPr>
+                        </m:funcPr>
+                        <m:fName>
+                          <m:limLow>
+                            <m:limLowPr>
+                              <m:ctrlPr>
+                                <a:rPr lang="en-US" b="0" i="1" smtClean="0">
+                                  <a:latin typeface="Cambria Math" panose="02040503050406030204" pitchFamily="18" charset="0"/>
+                                </a:rPr>
+                              </m:ctrlPr>
+                            </m:limLowPr>
+                            <m:e>
+                              <m:r>
+                                <m:rPr>
+                                  <m:sty m:val="p"/>
+                                </m:rPr>
+                                <a:rPr lang="en-US" b="0" i="0" smtClean="0">
+                                  <a:latin typeface="Cambria Math" panose="02040503050406030204" pitchFamily="18" charset="0"/>
+                                </a:rPr>
+                                <m:t>min</m:t>
+                              </m:r>
+                            </m:e>
+                            <m:lim>
+                              <m:r>
+                                <m:rPr>
+                                  <m:sty m:val="p"/>
+                                </m:rPr>
+                                <a:rPr lang="en-US" b="0" i="0" smtClean="0">
+                                  <a:latin typeface="Cambria Math" panose="02040503050406030204" pitchFamily="18" charset="0"/>
+                                </a:rPr>
+                                <m:t>u</m:t>
+                              </m:r>
+                            </m:lim>
+                          </m:limLow>
+                        </m:fName>
+                        <m:e>
+                          <m:nary>
+                            <m:naryPr>
+                              <m:chr m:val="∑"/>
+                              <m:ctrlPr>
+                                <a:rPr lang="en-US" b="0" i="1" smtClean="0">
+                                  <a:latin typeface="Cambria Math" panose="02040503050406030204" pitchFamily="18" charset="0"/>
+                                </a:rPr>
+                              </m:ctrlPr>
+                            </m:naryPr>
+                            <m:sub>
+                              <m:r>
+                                <m:rPr>
+                                  <m:brk m:alnAt="23"/>
+                                </m:rPr>
+                                <a:rPr lang="en-US" b="0" i="1" smtClean="0">
+                                  <a:latin typeface="Cambria Math" panose="02040503050406030204" pitchFamily="18" charset="0"/>
+                                </a:rPr>
+                                <m:t>𝑖</m:t>
+                              </m:r>
+                              <m:r>
+                                <a:rPr lang="en-US" b="0" i="1" smtClean="0">
+                                  <a:latin typeface="Cambria Math" panose="02040503050406030204" pitchFamily="18" charset="0"/>
+                                </a:rPr>
+                                <m:t>=1</m:t>
+                              </m:r>
+                            </m:sub>
+                            <m:sup>
+                              <m:r>
+                                <a:rPr lang="en-US" b="0" i="1" smtClean="0">
+                                  <a:latin typeface="Cambria Math" panose="02040503050406030204" pitchFamily="18" charset="0"/>
+                                </a:rPr>
+                                <m:t>𝑃𝐻</m:t>
+                              </m:r>
+                            </m:sup>
+                            <m:e>
+                              <m:sSub>
+                                <m:sSubPr>
+                                  <m:ctrlPr>
+                                    <a:rPr lang="en-US" b="0" i="1" smtClean="0">
+                                      <a:latin typeface="Cambria Math" panose="02040503050406030204" pitchFamily="18" charset="0"/>
+                                    </a:rPr>
+                                  </m:ctrlPr>
+                                </m:sSubPr>
+                                <m:e>
+                                  <m:r>
+                                    <a:rPr lang="en-US" b="0" i="1" smtClean="0">
+                                      <a:latin typeface="Cambria Math" panose="02040503050406030204" pitchFamily="18" charset="0"/>
+                                    </a:rPr>
+                                    <m:t>(</m:t>
+                                  </m:r>
+                                  <m:r>
+                                    <a:rPr lang="en-US" b="0" i="1" smtClean="0">
+                                      <a:latin typeface="Cambria Math" panose="02040503050406030204" pitchFamily="18" charset="0"/>
+                                    </a:rPr>
+                                    <m:t>𝑑𝑇</m:t>
+                                  </m:r>
+                                </m:e>
+                                <m:sub>
+                                  <m:r>
+                                    <a:rPr lang="en-US" b="0" i="1" smtClean="0">
+                                      <a:latin typeface="Cambria Math" panose="02040503050406030204" pitchFamily="18" charset="0"/>
+                                    </a:rPr>
+                                    <m:t>𝑢</m:t>
+                                  </m:r>
+                                </m:sub>
+                              </m:sSub>
+                              <m:r>
+                                <a:rPr lang="en-US" b="0" i="1" smtClean="0">
+                                  <a:latin typeface="Cambria Math" panose="02040503050406030204" pitchFamily="18" charset="0"/>
+                                </a:rPr>
+                                <m:t>+</m:t>
+                              </m:r>
+                              <m:r>
+                                <a:rPr lang="en-US" b="0" i="1" smtClean="0">
+                                  <a:latin typeface="Cambria Math" panose="02040503050406030204" pitchFamily="18" charset="0"/>
+                                </a:rPr>
+                                <m:t>𝑑</m:t>
+                              </m:r>
+                              <m:sSub>
+                                <m:sSubPr>
+                                  <m:ctrlPr>
+                                    <a:rPr lang="en-US" b="0" i="1" smtClean="0">
+                                      <a:latin typeface="Cambria Math" panose="02040503050406030204" pitchFamily="18" charset="0"/>
+                                    </a:rPr>
+                                  </m:ctrlPr>
+                                </m:sSubPr>
+                                <m:e>
+                                  <m:r>
+                                    <a:rPr lang="en-US" b="0" i="1" smtClean="0">
+                                      <a:latin typeface="Cambria Math" panose="02040503050406030204" pitchFamily="18" charset="0"/>
+                                    </a:rPr>
+                                    <m:t>𝑇</m:t>
+                                  </m:r>
+                                </m:e>
+                                <m:sub>
+                                  <m:r>
+                                    <a:rPr lang="en-US" b="0" i="1" smtClean="0">
+                                      <a:latin typeface="Cambria Math" panose="02040503050406030204" pitchFamily="18" charset="0"/>
+                                    </a:rPr>
+                                    <m:t>𝑙</m:t>
+                                  </m:r>
+                                </m:sub>
+                              </m:sSub>
+                              <m:r>
+                                <a:rPr lang="en-US" b="0" i="1" smtClean="0">
+                                  <a:latin typeface="Cambria Math" panose="02040503050406030204" pitchFamily="18" charset="0"/>
+                                </a:rPr>
+                                <m:t>)</m:t>
+                              </m:r>
+                            </m:e>
+                          </m:nary>
+                        </m:e>
+                      </m:func>
+                    </m:oMath>
+                  </m:oMathPara>
+                </a14:m>
+                <a:endParaRPr lang="en-US" dirty="0"/>
+              </a:p>
+            </p:txBody>
+          </p:sp>
+        </mc:Choice>
+        <mc:Fallback>
+          <p:sp>
+            <p:nvSpPr>
+              <p:cNvPr id="6" name="TextBox 5">
+                <a:extLst>
+                  <a:ext uri="{FF2B5EF4-FFF2-40B4-BE49-F238E27FC236}">
+                    <a16:creationId xmlns:a16="http://schemas.microsoft.com/office/drawing/2014/main" id="{16DEB784-AFED-4ECA-BAB2-4F9DAEB6BD1B}"/>
+                  </a:ext>
+                </a:extLst>
+              </p:cNvPr>
+              <p:cNvSpPr txBox="1">
+                <a:spLocks noRot="1" noChangeAspect="1" noMove="1" noResize="1" noEditPoints="1" noAdjustHandles="1" noChangeArrowheads="1" noChangeShapeType="1" noTextEdit="1"/>
+              </p:cNvSpPr>
+              <p:nvPr/>
+            </p:nvSpPr>
+            <p:spPr>
+              <a:xfrm>
+                <a:off x="7176781" y="2117368"/>
+                <a:ext cx="1836400" cy="778931"/>
+              </a:xfrm>
+              <a:prstGeom prst="rect">
+                <a:avLst/>
+              </a:prstGeom>
+              <a:blipFill>
+                <a:blip r:embed="rId3"/>
+                <a:stretch>
+                  <a:fillRect/>
+                </a:stretch>
+              </a:blipFill>
+            </p:spPr>
+            <p:txBody>
+              <a:bodyPr/>
+              <a:lstStyle/>
+              <a:p>
+                <a:r>
+                  <a:rPr lang="en-US">
+                    <a:noFill/>
+                  </a:rPr>
+                  <a:t> </a:t>
+                </a:r>
+              </a:p>
+            </p:txBody>
+          </p:sp>
+        </mc:Fallback>
+      </mc:AlternateContent>
+      <p:sp>
+        <p:nvSpPr>
+          <p:cNvPr id="7" name="TextBox 6">
+            <a:extLst>
+              <a:ext uri="{FF2B5EF4-FFF2-40B4-BE49-F238E27FC236}">
+                <a16:creationId xmlns:a16="http://schemas.microsoft.com/office/drawing/2014/main" id="{B6F15B68-D6D6-46D7-9E36-97D2927CFFE6}"/>
               </a:ext>
             </a:extLst>
           </p:cNvPr>
@@ -5054,8 +5213,8 @@
         </p:nvSpPr>
         <p:spPr>
           <a:xfrm>
-            <a:off x="1837189" y="1862356"/>
-            <a:ext cx="1132041" cy="369332"/>
+            <a:off x="9357237" y="2324265"/>
+            <a:ext cx="679994" cy="369332"/>
           </a:xfrm>
           <a:prstGeom prst="rect">
             <a:avLst/>
@@ -5070,17 +5229,17 @@
           <a:p>
             <a:r>
               <a:rPr lang="en-US" dirty="0"/>
-              <a:t>Alpha=0.1</a:t>
+              <a:t>PH=1</a:t>
             </a:r>
           </a:p>
         </p:txBody>
       </p:sp>
       <p:pic>
         <p:nvPicPr>
-          <p:cNvPr id="6" name="Picture 5">
-            <a:extLst>
-              <a:ext uri="{FF2B5EF4-FFF2-40B4-BE49-F238E27FC236}">
-                <a16:creationId xmlns:a16="http://schemas.microsoft.com/office/drawing/2014/main" id="{5BCCE26E-4ABC-415B-889E-C40F121DD68F}"/>
+          <p:cNvPr id="8" name="Picture 7">
+            <a:extLst>
+              <a:ext uri="{FF2B5EF4-FFF2-40B4-BE49-F238E27FC236}">
+                <a16:creationId xmlns:a16="http://schemas.microsoft.com/office/drawing/2014/main" id="{8256B481-302E-4069-B64D-CA322B67F98E}"/>
               </a:ext>
             </a:extLst>
           </p:cNvPr>
@@ -5090,27 +5249,284 @@
           <p:nvPr/>
         </p:nvPicPr>
         <p:blipFill>
-          <a:blip r:embed="rId3"/>
+          <a:blip r:embed="rId4"/>
           <a:stretch>
             <a:fillRect/>
           </a:stretch>
         </p:blipFill>
         <p:spPr>
           <a:xfrm>
-            <a:off x="6817868" y="2521190"/>
-            <a:ext cx="5052578" cy="3592032"/>
+            <a:off x="838200" y="2999866"/>
+            <a:ext cx="4460906" cy="3157810"/>
           </a:xfrm>
           <a:prstGeom prst="rect">
             <a:avLst/>
           </a:prstGeom>
         </p:spPr>
       </p:pic>
-      <p:sp>
-        <p:nvSpPr>
-          <p:cNvPr id="7" name="TextBox 6">
-            <a:extLst>
-              <a:ext uri="{FF2B5EF4-FFF2-40B4-BE49-F238E27FC236}">
-                <a16:creationId xmlns:a16="http://schemas.microsoft.com/office/drawing/2014/main" id="{E486DE04-31BC-4F41-A49F-DDEFCCCA69A5}"/>
+      <mc:AlternateContent xmlns:mc="http://schemas.openxmlformats.org/markup-compatibility/2006">
+        <mc:Choice xmlns:a14="http://schemas.microsoft.com/office/drawing/2010/main" Requires="a14">
+          <p:sp>
+            <p:nvSpPr>
+              <p:cNvPr id="9" name="TextBox 8">
+                <a:extLst>
+                  <a:ext uri="{FF2B5EF4-FFF2-40B4-BE49-F238E27FC236}">
+                    <a16:creationId xmlns:a16="http://schemas.microsoft.com/office/drawing/2014/main" id="{86232F01-8319-4C4C-A7F8-D1F729D1AB0C}"/>
+                  </a:ext>
+                </a:extLst>
+              </p:cNvPr>
+              <p:cNvSpPr txBox="1"/>
+              <p:nvPr/>
+            </p:nvSpPr>
+            <p:spPr>
+              <a:xfrm>
+                <a:off x="1696550" y="2201648"/>
+                <a:ext cx="1607876" cy="778931"/>
+              </a:xfrm>
+              <a:prstGeom prst="rect">
+                <a:avLst/>
+              </a:prstGeom>
+              <a:noFill/>
+            </p:spPr>
+            <p:txBody>
+              <a:bodyPr wrap="none" lIns="0" tIns="0" rIns="0" bIns="0" rtlCol="0">
+                <a:spAutoFit/>
+              </a:bodyPr>
+              <a:lstStyle/>
+              <a:p>
+                <a:pPr/>
+                <a14:m>
+                  <m:oMathPara xmlns:m="http://schemas.openxmlformats.org/officeDocument/2006/math">
+                    <m:oMathParaPr>
+                      <m:jc m:val="centerGroup"/>
+                    </m:oMathParaPr>
+                    <m:oMath xmlns:m="http://schemas.openxmlformats.org/officeDocument/2006/math">
+                      <m:func>
+                        <m:funcPr>
+                          <m:ctrlPr>
+                            <a:rPr lang="en-US" b="0" i="1" smtClean="0">
+                              <a:latin typeface="Cambria Math" panose="02040503050406030204" pitchFamily="18" charset="0"/>
+                            </a:rPr>
+                          </m:ctrlPr>
+                        </m:funcPr>
+                        <m:fName>
+                          <m:limLow>
+                            <m:limLowPr>
+                              <m:ctrlPr>
+                                <a:rPr lang="en-US" b="0" i="1" smtClean="0">
+                                  <a:latin typeface="Cambria Math" panose="02040503050406030204" pitchFamily="18" charset="0"/>
+                                </a:rPr>
+                              </m:ctrlPr>
+                            </m:limLowPr>
+                            <m:e>
+                              <m:r>
+                                <m:rPr>
+                                  <m:sty m:val="p"/>
+                                </m:rPr>
+                                <a:rPr lang="en-US" b="0" i="0" smtClean="0">
+                                  <a:latin typeface="Cambria Math" panose="02040503050406030204" pitchFamily="18" charset="0"/>
+                                </a:rPr>
+                                <m:t>min</m:t>
+                              </m:r>
+                            </m:e>
+                            <m:lim>
+                              <m:r>
+                                <m:rPr>
+                                  <m:sty m:val="p"/>
+                                </m:rPr>
+                                <a:rPr lang="en-US" b="0" i="0" smtClean="0">
+                                  <a:latin typeface="Cambria Math" panose="02040503050406030204" pitchFamily="18" charset="0"/>
+                                </a:rPr>
+                                <m:t>u</m:t>
+                              </m:r>
+                            </m:lim>
+                          </m:limLow>
+                        </m:fName>
+                        <m:e>
+                          <m:nary>
+                            <m:naryPr>
+                              <m:chr m:val="∑"/>
+                              <m:ctrlPr>
+                                <a:rPr lang="en-US" b="0" i="1" smtClean="0">
+                                  <a:latin typeface="Cambria Math" panose="02040503050406030204" pitchFamily="18" charset="0"/>
+                                </a:rPr>
+                              </m:ctrlPr>
+                            </m:naryPr>
+                            <m:sub>
+                              <m:r>
+                                <m:rPr>
+                                  <m:brk m:alnAt="23"/>
+                                </m:rPr>
+                                <a:rPr lang="en-US" b="0" i="1" smtClean="0">
+                                  <a:latin typeface="Cambria Math" panose="02040503050406030204" pitchFamily="18" charset="0"/>
+                                </a:rPr>
+                                <m:t>𝑖</m:t>
+                              </m:r>
+                              <m:r>
+                                <a:rPr lang="en-US" b="0" i="1" smtClean="0">
+                                  <a:latin typeface="Cambria Math" panose="02040503050406030204" pitchFamily="18" charset="0"/>
+                                </a:rPr>
+                                <m:t>=1</m:t>
+                              </m:r>
+                            </m:sub>
+                            <m:sup>
+                              <m:r>
+                                <a:rPr lang="en-US" b="0" i="1" smtClean="0">
+                                  <a:latin typeface="Cambria Math" panose="02040503050406030204" pitchFamily="18" charset="0"/>
+                                </a:rPr>
+                                <m:t>𝑃𝐻</m:t>
+                              </m:r>
+                            </m:sup>
+                            <m:e>
+                              <m:sSub>
+                                <m:sSubPr>
+                                  <m:ctrlPr>
+                                    <a:rPr lang="en-US" b="0" i="1" smtClean="0">
+                                      <a:latin typeface="Cambria Math" panose="02040503050406030204" pitchFamily="18" charset="0"/>
+                                    </a:rPr>
+                                  </m:ctrlPr>
+                                </m:sSubPr>
+                                <m:e>
+                                  <m:r>
+                                    <a:rPr lang="en-US" b="0" i="1" smtClean="0">
+                                      <a:latin typeface="Cambria Math" panose="02040503050406030204" pitchFamily="18" charset="0"/>
+                                    </a:rPr>
+                                    <m:t>𝑝</m:t>
+                                  </m:r>
+                                </m:e>
+                                <m:sub>
+                                  <m:r>
+                                    <a:rPr lang="en-US" b="0" i="1" smtClean="0">
+                                      <a:latin typeface="Cambria Math" panose="02040503050406030204" pitchFamily="18" charset="0"/>
+                                    </a:rPr>
+                                    <m:t>𝑖</m:t>
+                                  </m:r>
+                                </m:sub>
+                              </m:sSub>
+                              <m:sSub>
+                                <m:sSubPr>
+                                  <m:ctrlPr>
+                                    <a:rPr lang="en-US" b="0" i="1" smtClean="0">
+                                      <a:latin typeface="Cambria Math" panose="02040503050406030204" pitchFamily="18" charset="0"/>
+                                    </a:rPr>
+                                  </m:ctrlPr>
+                                </m:sSubPr>
+                                <m:e>
+                                  <m:r>
+                                    <a:rPr lang="en-US" b="0" i="1" smtClean="0">
+                                      <a:latin typeface="Cambria Math" panose="02040503050406030204" pitchFamily="18" charset="0"/>
+                                    </a:rPr>
+                                    <m:t>𝑃</m:t>
+                                  </m:r>
+                                </m:e>
+                                <m:sub>
+                                  <m:r>
+                                    <a:rPr lang="en-US" b="0" i="1" smtClean="0">
+                                      <a:latin typeface="Cambria Math" panose="02040503050406030204" pitchFamily="18" charset="0"/>
+                                    </a:rPr>
+                                    <m:t>𝑖</m:t>
+                                  </m:r>
+                                </m:sub>
+                              </m:sSub>
+                              <m:d>
+                                <m:dPr>
+                                  <m:ctrlPr>
+                                    <a:rPr lang="en-US" b="0" i="1" smtClean="0">
+                                      <a:latin typeface="Cambria Math" panose="02040503050406030204" pitchFamily="18" charset="0"/>
+                                    </a:rPr>
+                                  </m:ctrlPr>
+                                </m:dPr>
+                                <m:e>
+                                  <m:sSub>
+                                    <m:sSubPr>
+                                      <m:ctrlPr>
+                                        <a:rPr lang="en-US" b="0" i="1" smtClean="0">
+                                          <a:latin typeface="Cambria Math" panose="02040503050406030204" pitchFamily="18" charset="0"/>
+                                        </a:rPr>
+                                      </m:ctrlPr>
+                                    </m:sSubPr>
+                                    <m:e>
+                                      <m:r>
+                                        <a:rPr lang="en-US" b="0" i="1" smtClean="0">
+                                          <a:latin typeface="Cambria Math" panose="02040503050406030204" pitchFamily="18" charset="0"/>
+                                        </a:rPr>
+                                        <m:t>𝑢</m:t>
+                                      </m:r>
+                                    </m:e>
+                                    <m:sub>
+                                      <m:r>
+                                        <a:rPr lang="en-US" b="0" i="1" smtClean="0">
+                                          <a:latin typeface="Cambria Math" panose="02040503050406030204" pitchFamily="18" charset="0"/>
+                                        </a:rPr>
+                                        <m:t>𝑖</m:t>
+                                      </m:r>
+                                    </m:sub>
+                                  </m:sSub>
+                                </m:e>
+                              </m:d>
+                            </m:e>
+                          </m:nary>
+                        </m:e>
+                      </m:func>
+                    </m:oMath>
+                  </m:oMathPara>
+                </a14:m>
+                <a:endParaRPr lang="en-US" dirty="0"/>
+              </a:p>
+            </p:txBody>
+          </p:sp>
+        </mc:Choice>
+        <mc:Fallback>
+          <p:sp>
+            <p:nvSpPr>
+              <p:cNvPr id="9" name="TextBox 8">
+                <a:extLst>
+                  <a:ext uri="{FF2B5EF4-FFF2-40B4-BE49-F238E27FC236}">
+                    <a16:creationId xmlns:a16="http://schemas.microsoft.com/office/drawing/2014/main" id="{86232F01-8319-4C4C-A7F8-D1F729D1AB0C}"/>
+                  </a:ext>
+                </a:extLst>
+              </p:cNvPr>
+              <p:cNvSpPr txBox="1">
+                <a:spLocks noRot="1" noChangeAspect="1" noMove="1" noResize="1" noEditPoints="1" noAdjustHandles="1" noChangeArrowheads="1" noChangeShapeType="1" noTextEdit="1"/>
+              </p:cNvSpPr>
+              <p:nvPr/>
+            </p:nvSpPr>
+            <p:spPr>
+              <a:xfrm>
+                <a:off x="1696550" y="2201648"/>
+                <a:ext cx="1607876" cy="778931"/>
+              </a:xfrm>
+              <a:prstGeom prst="rect">
+                <a:avLst/>
+              </a:prstGeom>
+              <a:blipFill>
+                <a:blip r:embed="rId5"/>
+                <a:stretch>
+                  <a:fillRect/>
+                </a:stretch>
+              </a:blipFill>
+            </p:spPr>
+            <p:txBody>
+              <a:bodyPr/>
+              <a:lstStyle/>
+              <a:p>
+                <a:r>
+                  <a:rPr lang="en-US">
+                    <a:noFill/>
+                  </a:rPr>
+                  <a:t> </a:t>
+                </a:r>
+              </a:p>
+            </p:txBody>
+          </p:sp>
+        </mc:Fallback>
+      </mc:AlternateContent>
+      <p:sp>
+        <p:nvSpPr>
+          <p:cNvPr id="10" name="TextBox 9">
+            <a:extLst>
+              <a:ext uri="{FF2B5EF4-FFF2-40B4-BE49-F238E27FC236}">
+                <a16:creationId xmlns:a16="http://schemas.microsoft.com/office/drawing/2014/main" id="{360541BC-D51B-4D2D-AC9F-C44DFF4C8D59}"/>
               </a:ext>
             </a:extLst>
           </p:cNvPr>
@@ -5119,8 +5535,8 @@
         </p:nvSpPr>
         <p:spPr>
           <a:xfrm>
-            <a:off x="8340055" y="1862356"/>
-            <a:ext cx="1132041" cy="369332"/>
+            <a:off x="3729623" y="2436225"/>
+            <a:ext cx="679994" cy="369332"/>
           </a:xfrm>
           <a:prstGeom prst="rect">
             <a:avLst/>
@@ -5135,7 +5551,7 @@
           <a:p>
             <a:r>
               <a:rPr lang="en-US" dirty="0"/>
-              <a:t>Alpha=1.0</a:t>
+              <a:t>PH=1</a:t>
             </a:r>
           </a:p>
         </p:txBody>
@@ -5143,7 +5559,7 @@
     </p:spTree>
     <p:extLst>
       <p:ext uri="{BB962C8B-B14F-4D97-AF65-F5344CB8AC3E}">
-        <p14:creationId xmlns:p14="http://schemas.microsoft.com/office/powerpoint/2010/main" val="431000446"/>
+        <p14:creationId xmlns:p14="http://schemas.microsoft.com/office/powerpoint/2010/main" val="3792786487"/>
       </p:ext>
     </p:extLst>
   </p:cSld>

</xml_diff>